<commit_message>
Fixing error in the slide for lecture #02 in CS235 spring 2015.
</commit_message>
<xml_diff>
--- a/Lectures/CS235 - UI Design - Lecture #02 - 2015.01.27.pptx
+++ b/Lectures/CS235 - UI Design - Lecture #02 - 2015.01.27.pptx
@@ -254,7 +254,8 @@
           <a:p>
             <a:fld id="{D4172681-C581-F644-AAF5-C092E01AA013}" type="datetimeFigureOut">
               <a:rPr lang="en-US" smtClean="0"/>
-              <a:t>1/27/15</a:t>
+              <a:pPr/>
+              <a:t>3/15/2015</a:t>
             </a:fld>
             <a:endParaRPr lang="en-US"/>
           </a:p>
@@ -320,6 +321,7 @@
           <a:p>
             <a:fld id="{C2A581D9-7090-374C-A542-C325CF1D3FFC}" type="slidenum">
               <a:rPr lang="en-US" smtClean="0"/>
+              <a:pPr/>
               <a:t>‹#›</a:t>
             </a:fld>
             <a:endParaRPr lang="en-US"/>
@@ -329,7 +331,7 @@
     </p:spTree>
     <p:extLst>
       <p:ext uri="{BB962C8B-B14F-4D97-AF65-F5344CB8AC3E}">
-        <p14:creationId xmlns:p14="http://schemas.microsoft.com/office/powerpoint/2010/main" val="2257200665"/>
+        <p14:creationId xmlns:p14="http://schemas.microsoft.com/office/powerpoint/2010/main" xmlns="" val="2257200665"/>
       </p:ext>
     </p:extLst>
   </p:cSld>
@@ -388,14 +390,14 @@
           <a:effectLst/>
           <a:extLst>
             <a:ext uri="{909E8E84-426E-40dd-AFC4-6F175D3DCCD1}">
-              <a14:hiddenFill xmlns:a14="http://schemas.microsoft.com/office/drawing/2010/main">
+              <a14:hiddenFill xmlns:a14="http://schemas.microsoft.com/office/drawing/2010/main" xmlns="">
                 <a:solidFill>
                   <a:schemeClr val="accent1"/>
                 </a:solidFill>
               </a14:hiddenFill>
             </a:ext>
             <a:ext uri="{91240B29-F687-4f45-9708-019B960494DF}">
-              <a14:hiddenLine xmlns:a14="http://schemas.microsoft.com/office/drawing/2010/main" w="9525">
+              <a14:hiddenLine xmlns:a14="http://schemas.microsoft.com/office/drawing/2010/main" xmlns="" w="9525">
                 <a:solidFill>
                   <a:schemeClr val="tx1"/>
                 </a:solidFill>
@@ -405,7 +407,7 @@
               </a14:hiddenLine>
             </a:ext>
             <a:ext uri="{AF507438-7753-43e0-B8FC-AC1667EBCBE1}">
-              <a14:hiddenEffects xmlns:a14="http://schemas.microsoft.com/office/drawing/2010/main">
+              <a14:hiddenEffects xmlns:a14="http://schemas.microsoft.com/office/drawing/2010/main" xmlns="">
                 <a:effectLst>
                   <a:outerShdw blurRad="63500" dist="38099" dir="2700000" algn="ctr" rotWithShape="0">
                     <a:schemeClr val="bg2">
@@ -416,7 +418,7 @@
               </a14:hiddenEffects>
             </a:ext>
             <a:ext uri="{FAA26D3D-D897-4be2-8F04-BA451C77F1D7}">
-              <ma14:placeholderFlag xmlns:ma14="http://schemas.microsoft.com/office/mac/drawingml/2011/main" val="1"/>
+              <ma14:placeholderFlag xmlns:ma14="http://schemas.microsoft.com/office/mac/drawingml/2011/main" xmlns="" val="1"/>
             </a:ext>
           </a:extLst>
         </p:spPr>
@@ -461,14 +463,14 @@
           <a:effectLst/>
           <a:extLst>
             <a:ext uri="{909E8E84-426E-40dd-AFC4-6F175D3DCCD1}">
-              <a14:hiddenFill xmlns:a14="http://schemas.microsoft.com/office/drawing/2010/main">
+              <a14:hiddenFill xmlns:a14="http://schemas.microsoft.com/office/drawing/2010/main" xmlns="">
                 <a:solidFill>
                   <a:schemeClr val="accent1"/>
                 </a:solidFill>
               </a14:hiddenFill>
             </a:ext>
             <a:ext uri="{91240B29-F687-4f45-9708-019B960494DF}">
-              <a14:hiddenLine xmlns:a14="http://schemas.microsoft.com/office/drawing/2010/main" w="9525">
+              <a14:hiddenLine xmlns:a14="http://schemas.microsoft.com/office/drawing/2010/main" xmlns="" w="9525">
                 <a:solidFill>
                   <a:schemeClr val="tx1"/>
                 </a:solidFill>
@@ -478,7 +480,7 @@
               </a14:hiddenLine>
             </a:ext>
             <a:ext uri="{AF507438-7753-43e0-B8FC-AC1667EBCBE1}">
-              <a14:hiddenEffects xmlns:a14="http://schemas.microsoft.com/office/drawing/2010/main">
+              <a14:hiddenEffects xmlns:a14="http://schemas.microsoft.com/office/drawing/2010/main" xmlns="">
                 <a:effectLst>
                   <a:outerShdw blurRad="63500" dist="38099" dir="2700000" algn="ctr" rotWithShape="0">
                     <a:schemeClr val="bg2">
@@ -489,7 +491,7 @@
               </a14:hiddenEffects>
             </a:ext>
             <a:ext uri="{FAA26D3D-D897-4be2-8F04-BA451C77F1D7}">
-              <ma14:placeholderFlag xmlns:ma14="http://schemas.microsoft.com/office/mac/drawingml/2011/main" val="1"/>
+              <ma14:placeholderFlag xmlns:ma14="http://schemas.microsoft.com/office/mac/drawingml/2011/main" xmlns="" val="1"/>
             </a:ext>
           </a:extLst>
         </p:spPr>
@@ -539,7 +541,7 @@
           <a:effectLst/>
           <a:extLst>
             <a:ext uri="{AF507438-7753-43e0-B8FC-AC1667EBCBE1}">
-              <a14:hiddenEffects xmlns:a14="http://schemas.microsoft.com/office/drawing/2010/main">
+              <a14:hiddenEffects xmlns:a14="http://schemas.microsoft.com/office/drawing/2010/main" xmlns="">
                 <a:effectLst>
                   <a:outerShdw blurRad="63500" dist="38099" dir="2700000" algn="ctr" rotWithShape="0">
                     <a:srgbClr val="000000">
@@ -550,7 +552,7 @@
               </a14:hiddenEffects>
             </a:ext>
             <a:ext uri="{53640926-AAD7-44d8-BBD7-CCE9431645EC}">
-              <a14:shadowObscured xmlns:a14="http://schemas.microsoft.com/office/drawing/2010/main" val="1"/>
+              <a14:shadowObscured xmlns:a14="http://schemas.microsoft.com/office/drawing/2010/main" xmlns="" val="1"/>
             </a:ext>
           </a:extLst>
         </p:spPr>
@@ -580,14 +582,14 @@
           <a:effectLst/>
           <a:extLst>
             <a:ext uri="{909E8E84-426E-40dd-AFC4-6F175D3DCCD1}">
-              <a14:hiddenFill xmlns:a14="http://schemas.microsoft.com/office/drawing/2010/main">
+              <a14:hiddenFill xmlns:a14="http://schemas.microsoft.com/office/drawing/2010/main" xmlns="">
                 <a:solidFill>
                   <a:schemeClr val="accent1"/>
                 </a:solidFill>
               </a14:hiddenFill>
             </a:ext>
             <a:ext uri="{91240B29-F687-4f45-9708-019B960494DF}">
-              <a14:hiddenLine xmlns:a14="http://schemas.microsoft.com/office/drawing/2010/main" w="9525">
+              <a14:hiddenLine xmlns:a14="http://schemas.microsoft.com/office/drawing/2010/main" xmlns="" w="9525">
                 <a:solidFill>
                   <a:schemeClr val="tx1"/>
                 </a:solidFill>
@@ -597,7 +599,7 @@
               </a14:hiddenLine>
             </a:ext>
             <a:ext uri="{AF507438-7753-43e0-B8FC-AC1667EBCBE1}">
-              <a14:hiddenEffects xmlns:a14="http://schemas.microsoft.com/office/drawing/2010/main">
+              <a14:hiddenEffects xmlns:a14="http://schemas.microsoft.com/office/drawing/2010/main" xmlns="">
                 <a:effectLst>
                   <a:outerShdw blurRad="63500" dist="38099" dir="2700000" algn="ctr" rotWithShape="0">
                     <a:schemeClr val="bg2">
@@ -608,7 +610,7 @@
               </a14:hiddenEffects>
             </a:ext>
             <a:ext uri="{FAA26D3D-D897-4be2-8F04-BA451C77F1D7}">
-              <ma14:placeholderFlag xmlns:ma14="http://schemas.microsoft.com/office/mac/drawingml/2011/main" val="1"/>
+              <ma14:placeholderFlag xmlns:ma14="http://schemas.microsoft.com/office/mac/drawingml/2011/main" xmlns="" val="1"/>
             </a:ext>
           </a:extLst>
         </p:spPr>
@@ -681,14 +683,14 @@
           <a:effectLst/>
           <a:extLst>
             <a:ext uri="{909E8E84-426E-40dd-AFC4-6F175D3DCCD1}">
-              <a14:hiddenFill xmlns:a14="http://schemas.microsoft.com/office/drawing/2010/main">
+              <a14:hiddenFill xmlns:a14="http://schemas.microsoft.com/office/drawing/2010/main" xmlns="">
                 <a:solidFill>
                   <a:schemeClr val="accent1"/>
                 </a:solidFill>
               </a14:hiddenFill>
             </a:ext>
             <a:ext uri="{91240B29-F687-4f45-9708-019B960494DF}">
-              <a14:hiddenLine xmlns:a14="http://schemas.microsoft.com/office/drawing/2010/main" w="9525">
+              <a14:hiddenLine xmlns:a14="http://schemas.microsoft.com/office/drawing/2010/main" xmlns="" w="9525">
                 <a:solidFill>
                   <a:schemeClr val="tx1"/>
                 </a:solidFill>
@@ -698,7 +700,7 @@
               </a14:hiddenLine>
             </a:ext>
             <a:ext uri="{AF507438-7753-43e0-B8FC-AC1667EBCBE1}">
-              <a14:hiddenEffects xmlns:a14="http://schemas.microsoft.com/office/drawing/2010/main">
+              <a14:hiddenEffects xmlns:a14="http://schemas.microsoft.com/office/drawing/2010/main" xmlns="">
                 <a:effectLst>
                   <a:outerShdw blurRad="63500" dist="38099" dir="2700000" algn="ctr" rotWithShape="0">
                     <a:schemeClr val="bg2">
@@ -709,7 +711,7 @@
               </a14:hiddenEffects>
             </a:ext>
             <a:ext uri="{FAA26D3D-D897-4be2-8F04-BA451C77F1D7}">
-              <ma14:placeholderFlag xmlns:ma14="http://schemas.microsoft.com/office/mac/drawingml/2011/main" val="1"/>
+              <ma14:placeholderFlag xmlns:ma14="http://schemas.microsoft.com/office/mac/drawingml/2011/main" xmlns="" val="1"/>
             </a:ext>
           </a:extLst>
         </p:spPr>
@@ -754,14 +756,14 @@
           <a:effectLst/>
           <a:extLst>
             <a:ext uri="{909E8E84-426E-40dd-AFC4-6F175D3DCCD1}">
-              <a14:hiddenFill xmlns:a14="http://schemas.microsoft.com/office/drawing/2010/main">
+              <a14:hiddenFill xmlns:a14="http://schemas.microsoft.com/office/drawing/2010/main" xmlns="">
                 <a:solidFill>
                   <a:schemeClr val="accent1"/>
                 </a:solidFill>
               </a14:hiddenFill>
             </a:ext>
             <a:ext uri="{91240B29-F687-4f45-9708-019B960494DF}">
-              <a14:hiddenLine xmlns:a14="http://schemas.microsoft.com/office/drawing/2010/main" w="9525">
+              <a14:hiddenLine xmlns:a14="http://schemas.microsoft.com/office/drawing/2010/main" xmlns="" w="9525">
                 <a:solidFill>
                   <a:schemeClr val="tx1"/>
                 </a:solidFill>
@@ -771,7 +773,7 @@
               </a14:hiddenLine>
             </a:ext>
             <a:ext uri="{AF507438-7753-43e0-B8FC-AC1667EBCBE1}">
-              <a14:hiddenEffects xmlns:a14="http://schemas.microsoft.com/office/drawing/2010/main">
+              <a14:hiddenEffects xmlns:a14="http://schemas.microsoft.com/office/drawing/2010/main" xmlns="">
                 <a:effectLst>
                   <a:outerShdw blurRad="63500" dist="38099" dir="2700000" algn="ctr" rotWithShape="0">
                     <a:schemeClr val="bg2">
@@ -782,7 +784,7 @@
               </a14:hiddenEffects>
             </a:ext>
             <a:ext uri="{FAA26D3D-D897-4be2-8F04-BA451C77F1D7}">
-              <ma14:placeholderFlag xmlns:ma14="http://schemas.microsoft.com/office/mac/drawingml/2011/main" val="1"/>
+              <ma14:placeholderFlag xmlns:ma14="http://schemas.microsoft.com/office/mac/drawingml/2011/main" xmlns="" val="1"/>
             </a:ext>
           </a:extLst>
         </p:spPr>
@@ -810,7 +812,7 @@
     </p:spTree>
     <p:extLst>
       <p:ext uri="{BB962C8B-B14F-4D97-AF65-F5344CB8AC3E}">
-        <p14:creationId xmlns:p14="http://schemas.microsoft.com/office/powerpoint/2010/main" val="2181768727"/>
+        <p14:creationId xmlns:p14="http://schemas.microsoft.com/office/powerpoint/2010/main" xmlns="" val="2181768727"/>
       </p:ext>
     </p:extLst>
   </p:cSld>
@@ -983,7 +985,7 @@
           <a:effectLst/>
           <a:extLst>
             <a:ext uri="{91240B29-F687-4f45-9708-019B960494DF}">
-              <a14:hiddenLine xmlns:a14="http://schemas.microsoft.com/office/drawing/2010/main" w="12700">
+              <a14:hiddenLine xmlns:a14="http://schemas.microsoft.com/office/drawing/2010/main" xmlns="" w="12700">
                 <a:solidFill>
                   <a:schemeClr val="tx1"/>
                 </a:solidFill>
@@ -993,7 +995,7 @@
               </a14:hiddenLine>
             </a:ext>
             <a:ext uri="{AF507438-7753-43e0-B8FC-AC1667EBCBE1}">
-              <a14:hiddenEffects xmlns:a14="http://schemas.microsoft.com/office/drawing/2010/main">
+              <a14:hiddenEffects xmlns:a14="http://schemas.microsoft.com/office/drawing/2010/main" xmlns="">
                 <a:effectLst>
                   <a:outerShdw blurRad="63500" dist="38099" dir="2700000" algn="ctr" rotWithShape="0">
                     <a:schemeClr val="bg2">
@@ -1128,7 +1130,7 @@
             <a:effectLst/>
             <a:extLst>
               <a:ext uri="{AF507438-7753-43e0-B8FC-AC1667EBCBE1}">
-                <a14:hiddenEffects xmlns:a14="http://schemas.microsoft.com/office/drawing/2010/main">
+                <a14:hiddenEffects xmlns:a14="http://schemas.microsoft.com/office/drawing/2010/main" xmlns="">
                   <a:effectLst>
                     <a:outerShdw blurRad="63500" dist="38099" dir="2700000" algn="ctr" rotWithShape="0">
                       <a:schemeClr val="bg2">
@@ -1181,7 +1183,7 @@
             <a:effectLst/>
             <a:extLst>
               <a:ext uri="{AF507438-7753-43e0-B8FC-AC1667EBCBE1}">
-                <a14:hiddenEffects xmlns:a14="http://schemas.microsoft.com/office/drawing/2010/main">
+                <a14:hiddenEffects xmlns:a14="http://schemas.microsoft.com/office/drawing/2010/main" xmlns="">
                   <a:effectLst>
                     <a:outerShdw blurRad="63500" dist="38099" dir="2700000" algn="ctr" rotWithShape="0">
                       <a:schemeClr val="bg2">
@@ -1234,7 +1236,7 @@
             <a:effectLst/>
             <a:extLst>
               <a:ext uri="{AF507438-7753-43e0-B8FC-AC1667EBCBE1}">
-                <a14:hiddenEffects xmlns:a14="http://schemas.microsoft.com/office/drawing/2010/main">
+                <a14:hiddenEffects xmlns:a14="http://schemas.microsoft.com/office/drawing/2010/main" xmlns="">
                   <a:effectLst>
                     <a:outerShdw blurRad="63500" dist="38099" dir="2700000" algn="ctr" rotWithShape="0">
                       <a:schemeClr val="bg2">
@@ -1287,7 +1289,7 @@
             <a:effectLst/>
             <a:extLst>
               <a:ext uri="{AF507438-7753-43e0-B8FC-AC1667EBCBE1}">
-                <a14:hiddenEffects xmlns:a14="http://schemas.microsoft.com/office/drawing/2010/main">
+                <a14:hiddenEffects xmlns:a14="http://schemas.microsoft.com/office/drawing/2010/main" xmlns="">
                   <a:effectLst>
                     <a:outerShdw blurRad="63500" dist="38099" dir="2700000" algn="ctr" rotWithShape="0">
                       <a:schemeClr val="bg2">
@@ -1338,12 +1340,12 @@
             <a:effectLst/>
             <a:extLst>
               <a:ext uri="{909E8E84-426E-40dd-AFC4-6F175D3DCCD1}">
-                <a14:hiddenFill xmlns:a14="http://schemas.microsoft.com/office/drawing/2010/main">
+                <a14:hiddenFill xmlns:a14="http://schemas.microsoft.com/office/drawing/2010/main" xmlns="">
                   <a:noFill/>
                 </a14:hiddenFill>
               </a:ext>
               <a:ext uri="{AF507438-7753-43e0-B8FC-AC1667EBCBE1}">
-                <a14:hiddenEffects xmlns:a14="http://schemas.microsoft.com/office/drawing/2010/main">
+                <a14:hiddenEffects xmlns:a14="http://schemas.microsoft.com/office/drawing/2010/main" xmlns="">
                   <a:effectLst>
                     <a:outerShdw blurRad="63500" dist="38099" dir="2700000" algn="ctr" rotWithShape="0">
                       <a:schemeClr val="bg2">
@@ -1391,14 +1393,14 @@
             <a:effectLst/>
             <a:extLst>
               <a:ext uri="{909E8E84-426E-40dd-AFC4-6F175D3DCCD1}">
-                <a14:hiddenFill xmlns:a14="http://schemas.microsoft.com/office/drawing/2010/main">
+                <a14:hiddenFill xmlns:a14="http://schemas.microsoft.com/office/drawing/2010/main" xmlns="">
                   <a:solidFill>
                     <a:schemeClr val="accent1"/>
                   </a:solidFill>
                 </a14:hiddenFill>
               </a:ext>
               <a:ext uri="{AF507438-7753-43e0-B8FC-AC1667EBCBE1}">
-                <a14:hiddenEffects xmlns:a14="http://schemas.microsoft.com/office/drawing/2010/main">
+                <a14:hiddenEffects xmlns:a14="http://schemas.microsoft.com/office/drawing/2010/main" xmlns="">
                   <a:effectLst>
                     <a:outerShdw blurRad="63500" dist="38099" dir="2700000" algn="ctr" rotWithShape="0">
                       <a:schemeClr val="bg2">
@@ -1430,7 +1432,7 @@
   <p:timing>
     <p:tnLst>
       <p:par>
-        <p:cTn xmlns:p14="http://schemas.microsoft.com/office/powerpoint/2010/main" id="1" dur="indefinite" restart="never" nodeType="tmRoot"/>
+        <p:cTn id="1" dur="indefinite" restart="never" nodeType="tmRoot"/>
       </p:par>
     </p:tnLst>
   </p:timing>
@@ -1560,7 +1562,7 @@
     </p:spTree>
     <p:extLst>
       <p:ext uri="{BB962C8B-B14F-4D97-AF65-F5344CB8AC3E}">
-        <p14:creationId xmlns:p14="http://schemas.microsoft.com/office/powerpoint/2010/main" val="2277753422"/>
+        <p14:creationId xmlns:p14="http://schemas.microsoft.com/office/powerpoint/2010/main" xmlns="" val="2277753422"/>
       </p:ext>
     </p:extLst>
   </p:cSld>
@@ -1620,14 +1622,14 @@
           <a:effectLst/>
           <a:extLst>
             <a:ext uri="{909E8E84-426E-40dd-AFC4-6F175D3DCCD1}">
-              <a14:hiddenFill xmlns:a14="http://schemas.microsoft.com/office/drawing/2010/main">
+              <a14:hiddenFill xmlns:a14="http://schemas.microsoft.com/office/drawing/2010/main" xmlns="">
                 <a:solidFill>
                   <a:schemeClr val="accent1"/>
                 </a:solidFill>
               </a14:hiddenFill>
             </a:ext>
             <a:ext uri="{91240B29-F687-4f45-9708-019B960494DF}">
-              <a14:hiddenLine xmlns:a14="http://schemas.microsoft.com/office/drawing/2010/main" w="9525">
+              <a14:hiddenLine xmlns:a14="http://schemas.microsoft.com/office/drawing/2010/main" xmlns="" w="9525">
                 <a:solidFill>
                   <a:schemeClr val="tx1"/>
                 </a:solidFill>
@@ -1637,7 +1639,7 @@
               </a14:hiddenLine>
             </a:ext>
             <a:ext uri="{AF507438-7753-43e0-B8FC-AC1667EBCBE1}">
-              <a14:hiddenEffects xmlns:a14="http://schemas.microsoft.com/office/drawing/2010/main">
+              <a14:hiddenEffects xmlns:a14="http://schemas.microsoft.com/office/drawing/2010/main" xmlns="">
                 <a:effectLst>
                   <a:outerShdw blurRad="63500" dist="38099" dir="2700000" algn="ctr" rotWithShape="0">
                     <a:schemeClr val="bg2">
@@ -1648,7 +1650,7 @@
               </a14:hiddenEffects>
             </a:ext>
             <a:ext uri="{FAA26D3D-D897-4be2-8F04-BA451C77F1D7}">
-              <ma14:placeholderFlag xmlns:ma14="http://schemas.microsoft.com/office/mac/drawingml/2011/main" val="1"/>
+              <ma14:placeholderFlag xmlns:ma14="http://schemas.microsoft.com/office/mac/drawingml/2011/main" xmlns="" val="1"/>
             </a:ext>
           </a:extLst>
         </p:spPr>
@@ -1693,14 +1695,14 @@
           <a:effectLst/>
           <a:extLst>
             <a:ext uri="{909E8E84-426E-40dd-AFC4-6F175D3DCCD1}">
-              <a14:hiddenFill xmlns:a14="http://schemas.microsoft.com/office/drawing/2010/main">
+              <a14:hiddenFill xmlns:a14="http://schemas.microsoft.com/office/drawing/2010/main" xmlns="">
                 <a:solidFill>
                   <a:schemeClr val="accent1"/>
                 </a:solidFill>
               </a14:hiddenFill>
             </a:ext>
             <a:ext uri="{91240B29-F687-4f45-9708-019B960494DF}">
-              <a14:hiddenLine xmlns:a14="http://schemas.microsoft.com/office/drawing/2010/main" w="9525">
+              <a14:hiddenLine xmlns:a14="http://schemas.microsoft.com/office/drawing/2010/main" xmlns="" w="9525">
                 <a:solidFill>
                   <a:schemeClr val="tx1"/>
                 </a:solidFill>
@@ -1710,7 +1712,7 @@
               </a14:hiddenLine>
             </a:ext>
             <a:ext uri="{AF507438-7753-43e0-B8FC-AC1667EBCBE1}">
-              <a14:hiddenEffects xmlns:a14="http://schemas.microsoft.com/office/drawing/2010/main">
+              <a14:hiddenEffects xmlns:a14="http://schemas.microsoft.com/office/drawing/2010/main" xmlns="">
                 <a:effectLst>
                   <a:outerShdw blurRad="63500" dist="38099" dir="2700000" algn="ctr" rotWithShape="0">
                     <a:schemeClr val="bg2">
@@ -1721,7 +1723,7 @@
               </a14:hiddenEffects>
             </a:ext>
             <a:ext uri="{FAA26D3D-D897-4be2-8F04-BA451C77F1D7}">
-              <ma14:placeholderFlag xmlns:ma14="http://schemas.microsoft.com/office/mac/drawingml/2011/main" val="1"/>
+              <ma14:placeholderFlag xmlns:ma14="http://schemas.microsoft.com/office/mac/drawingml/2011/main" xmlns="" val="1"/>
             </a:ext>
           </a:extLst>
         </p:spPr>
@@ -1794,14 +1796,14 @@
           <a:effectLst/>
           <a:extLst>
             <a:ext uri="{909E8E84-426E-40dd-AFC4-6F175D3DCCD1}">
-              <a14:hiddenFill xmlns:a14="http://schemas.microsoft.com/office/drawing/2010/main">
+              <a14:hiddenFill xmlns:a14="http://schemas.microsoft.com/office/drawing/2010/main" xmlns="">
                 <a:solidFill>
                   <a:schemeClr val="accent1"/>
                 </a:solidFill>
               </a14:hiddenFill>
             </a:ext>
             <a:ext uri="{91240B29-F687-4f45-9708-019B960494DF}">
-              <a14:hiddenLine xmlns:a14="http://schemas.microsoft.com/office/drawing/2010/main" w="9525">
+              <a14:hiddenLine xmlns:a14="http://schemas.microsoft.com/office/drawing/2010/main" xmlns="" w="9525">
                 <a:solidFill>
                   <a:schemeClr val="tx1"/>
                 </a:solidFill>
@@ -1811,7 +1813,7 @@
               </a14:hiddenLine>
             </a:ext>
             <a:ext uri="{AF507438-7753-43e0-B8FC-AC1667EBCBE1}">
-              <a14:hiddenEffects xmlns:a14="http://schemas.microsoft.com/office/drawing/2010/main">
+              <a14:hiddenEffects xmlns:a14="http://schemas.microsoft.com/office/drawing/2010/main" xmlns="">
                 <a:effectLst>
                   <a:outerShdw blurRad="63500" dist="38099" dir="2700000" algn="ctr" rotWithShape="0">
                     <a:schemeClr val="bg2">
@@ -1822,7 +1824,7 @@
               </a14:hiddenEffects>
             </a:ext>
             <a:ext uri="{FAA26D3D-D897-4be2-8F04-BA451C77F1D7}">
-              <ma14:placeholderFlag xmlns:ma14="http://schemas.microsoft.com/office/mac/drawingml/2011/main" val="1"/>
+              <ma14:placeholderFlag xmlns:ma14="http://schemas.microsoft.com/office/mac/drawingml/2011/main" xmlns="" val="1"/>
             </a:ext>
           </a:extLst>
         </p:spPr>
@@ -1891,12 +1893,12 @@
             <a:effectLst/>
             <a:extLst>
               <a:ext uri="{909E8E84-426E-40dd-AFC4-6F175D3DCCD1}">
-                <a14:hiddenFill xmlns:a14="http://schemas.microsoft.com/office/drawing/2010/main">
+                <a14:hiddenFill xmlns:a14="http://schemas.microsoft.com/office/drawing/2010/main" xmlns="">
                   <a:noFill/>
                 </a14:hiddenFill>
               </a:ext>
               <a:ext uri="{AF507438-7753-43e0-B8FC-AC1667EBCBE1}">
-                <a14:hiddenEffects xmlns:a14="http://schemas.microsoft.com/office/drawing/2010/main">
+                <a14:hiddenEffects xmlns:a14="http://schemas.microsoft.com/office/drawing/2010/main" xmlns="">
                   <a:effectLst>
                     <a:outerShdw blurRad="63500" dist="38099" dir="2700000" algn="ctr" rotWithShape="0">
                       <a:schemeClr val="bg2">
@@ -1946,7 +1948,7 @@
             <a:effectLst/>
             <a:extLst>
               <a:ext uri="{AF507438-7753-43e0-B8FC-AC1667EBCBE1}">
-                <a14:hiddenEffects xmlns:a14="http://schemas.microsoft.com/office/drawing/2010/main">
+                <a14:hiddenEffects xmlns:a14="http://schemas.microsoft.com/office/drawing/2010/main" xmlns="">
                   <a:effectLst>
                     <a:outerShdw blurRad="63500" dist="38099" dir="2700000" algn="ctr" rotWithShape="0">
                       <a:schemeClr val="bg2">
@@ -1999,7 +2001,7 @@
             <a:effectLst/>
             <a:extLst>
               <a:ext uri="{AF507438-7753-43e0-B8FC-AC1667EBCBE1}">
-                <a14:hiddenEffects xmlns:a14="http://schemas.microsoft.com/office/drawing/2010/main">
+                <a14:hiddenEffects xmlns:a14="http://schemas.microsoft.com/office/drawing/2010/main" xmlns="">
                   <a:effectLst>
                     <a:outerShdw blurRad="63500" dist="38099" dir="2700000" algn="ctr" rotWithShape="0">
                       <a:schemeClr val="bg2">
@@ -2052,7 +2054,7 @@
             <a:effectLst/>
             <a:extLst>
               <a:ext uri="{AF507438-7753-43e0-B8FC-AC1667EBCBE1}">
-                <a14:hiddenEffects xmlns:a14="http://schemas.microsoft.com/office/drawing/2010/main">
+                <a14:hiddenEffects xmlns:a14="http://schemas.microsoft.com/office/drawing/2010/main" xmlns="">
                   <a:effectLst>
                     <a:outerShdw blurRad="63500" dist="38099" dir="2700000" algn="ctr" rotWithShape="0">
                       <a:schemeClr val="bg2">
@@ -2105,7 +2107,7 @@
             <a:effectLst/>
             <a:extLst>
               <a:ext uri="{AF507438-7753-43e0-B8FC-AC1667EBCBE1}">
-                <a14:hiddenEffects xmlns:a14="http://schemas.microsoft.com/office/drawing/2010/main">
+                <a14:hiddenEffects xmlns:a14="http://schemas.microsoft.com/office/drawing/2010/main" xmlns="">
                   <a:effectLst>
                     <a:outerShdw blurRad="63500" dist="38099" dir="2700000" algn="ctr" rotWithShape="0">
                       <a:schemeClr val="bg2">
@@ -2141,7 +2143,7 @@
           <a:blip r:embed="rId4">
             <a:extLst>
               <a:ext uri="{28A0092B-C50C-407E-A947-70E740481C1C}">
-                <a14:useLocalDpi xmlns:a14="http://schemas.microsoft.com/office/drawing/2010/main" val="0"/>
+                <a14:useLocalDpi xmlns:a14="http://schemas.microsoft.com/office/drawing/2010/main" xmlns="" val="0"/>
               </a:ext>
             </a:extLst>
           </a:blip>
@@ -2161,7 +2163,7 @@
           <a:noFill/>
           <a:extLst>
             <a:ext uri="{909E8E84-426E-40dd-AFC4-6F175D3DCCD1}">
-              <a14:hiddenFill xmlns:a14="http://schemas.microsoft.com/office/drawing/2010/main">
+              <a14:hiddenFill xmlns:a14="http://schemas.microsoft.com/office/drawing/2010/main" xmlns="">
                 <a:solidFill>
                   <a:srgbClr val="FFFFFF"/>
                 </a:solidFill>
@@ -2262,7 +2264,7 @@
   <p:timing>
     <p:tnLst>
       <p:par>
-        <p:cTn xmlns:p14="http://schemas.microsoft.com/office/powerpoint/2010/main" id="1" dur="indefinite" restart="never" nodeType="tmRoot"/>
+        <p:cTn id="1" dur="indefinite" restart="never" nodeType="tmRoot"/>
       </p:par>
     </p:tnLst>
   </p:timing>
@@ -2738,23 +2740,19 @@
               <a:t>235: User Interface Design</a:t>
             </a:r>
             <a:r>
-              <a:rPr lang="en-US" sz="3600" dirty="0"/>
+              <a:rPr lang="en-US" sz="3600"/>
               <a:t/>
             </a:r>
             <a:br>
-              <a:rPr lang="en-US" sz="3600" dirty="0"/>
+              <a:rPr lang="en-US" sz="3600"/>
             </a:br>
             <a:r>
+              <a:rPr lang="en-US" sz="2400" smtClean="0"/>
+              <a:t>January 27 Class </a:t>
+            </a:r>
+            <a:r>
               <a:rPr lang="en-US" sz="2400" dirty="0"/>
-              <a:t>August </a:t>
-            </a:r>
-            <a:r>
-              <a:rPr lang="en-US" sz="2400" dirty="0" smtClean="0"/>
-              <a:t>27 </a:t>
-            </a:r>
-            <a:r>
-              <a:rPr lang="en-US" sz="2400" dirty="0"/>
-              <a:t>Class Meeting</a:t>
+              <a:t>Meeting</a:t>
             </a:r>
           </a:p>
         </p:txBody>
@@ -2844,7 +2842,7 @@
           <a:blip r:embed="rId3">
             <a:extLst>
               <a:ext uri="{28A0092B-C50C-407E-A947-70E740481C1C}">
-                <a14:useLocalDpi xmlns:a14="http://schemas.microsoft.com/office/drawing/2010/main" val="0"/>
+                <a14:useLocalDpi xmlns:a14="http://schemas.microsoft.com/office/drawing/2010/main" xmlns="" val="0"/>
               </a:ext>
             </a:extLst>
           </a:blip>
@@ -2868,14 +2866,14 @@
           <a:effectLst/>
           <a:extLst>
             <a:ext uri="{909E8E84-426E-40dd-AFC4-6F175D3DCCD1}">
-              <a14:hiddenFill xmlns:a14="http://schemas.microsoft.com/office/drawing/2010/main">
+              <a14:hiddenFill xmlns:a14="http://schemas.microsoft.com/office/drawing/2010/main" xmlns="">
                 <a:solidFill>
                   <a:schemeClr val="accent1"/>
                 </a:solidFill>
               </a14:hiddenFill>
             </a:ext>
             <a:ext uri="{91240B29-F687-4f45-9708-019B960494DF}">
-              <a14:hiddenLine xmlns:a14="http://schemas.microsoft.com/office/drawing/2010/main" w="9525">
+              <a14:hiddenLine xmlns:a14="http://schemas.microsoft.com/office/drawing/2010/main" xmlns="" w="9525">
                 <a:solidFill>
                   <a:schemeClr val="tx1"/>
                 </a:solidFill>
@@ -2885,7 +2883,7 @@
               </a14:hiddenLine>
             </a:ext>
             <a:ext uri="{AF507438-7753-43e0-B8FC-AC1667EBCBE1}">
-              <a14:hiddenEffects xmlns:a14="http://schemas.microsoft.com/office/drawing/2010/main">
+              <a14:hiddenEffects xmlns:a14="http://schemas.microsoft.com/office/drawing/2010/main" xmlns="">
                 <a:effectLst>
                   <a:outerShdw blurRad="63500" dist="38099" dir="2700000" algn="ctr" rotWithShape="0">
                     <a:schemeClr val="bg2">
@@ -2910,7 +2908,7 @@
           <a:blip r:embed="rId4">
             <a:extLst>
               <a:ext uri="{28A0092B-C50C-407E-A947-70E740481C1C}">
-                <a14:useLocalDpi xmlns:a14="http://schemas.microsoft.com/office/drawing/2010/main" val="0"/>
+                <a14:useLocalDpi xmlns:a14="http://schemas.microsoft.com/office/drawing/2010/main" xmlns="" val="0"/>
               </a:ext>
             </a:extLst>
           </a:blip>
@@ -2930,7 +2928,7 @@
           <a:noFill/>
           <a:extLst>
             <a:ext uri="{909E8E84-426E-40dd-AFC4-6F175D3DCCD1}">
-              <a14:hiddenFill xmlns:a14="http://schemas.microsoft.com/office/drawing/2010/main">
+              <a14:hiddenFill xmlns:a14="http://schemas.microsoft.com/office/drawing/2010/main" xmlns="">
                 <a:solidFill>
                   <a:srgbClr val="FFFFFF"/>
                 </a:solidFill>
@@ -2947,7 +2945,7 @@
   <p:timing>
     <p:tnLst>
       <p:par>
-        <p:cTn xmlns:p14="http://schemas.microsoft.com/office/powerpoint/2010/main" id="1" dur="indefinite" restart="never" nodeType="tmRoot"/>
+        <p:cTn id="1" dur="indefinite" restart="never" nodeType="tmRoot"/>
       </p:par>
     </p:tnLst>
   </p:timing>
@@ -3092,7 +3090,7 @@
     </p:spTree>
     <p:extLst>
       <p:ext uri="{BB962C8B-B14F-4D97-AF65-F5344CB8AC3E}">
-        <p14:creationId xmlns:p14="http://schemas.microsoft.com/office/powerpoint/2010/main" val="640380216"/>
+        <p14:creationId xmlns:p14="http://schemas.microsoft.com/office/powerpoint/2010/main" xmlns="" val="640380216"/>
       </p:ext>
     </p:extLst>
   </p:cSld>
@@ -3102,7 +3100,7 @@
   <p:timing>
     <p:tnLst>
       <p:par>
-        <p:cTn xmlns:p14="http://schemas.microsoft.com/office/powerpoint/2010/main" id="1" dur="indefinite" restart="never" nodeType="tmRoot">
+        <p:cTn id="1" dur="indefinite" restart="never" nodeType="tmRoot">
           <p:childTnLst>
             <p:seq concurrent="1" nextAc="seek">
               <p:cTn id="2" dur="indefinite" nodeType="mainSeq">
@@ -3504,11 +3502,7 @@
           <a:p>
             <a:r>
               <a:rPr lang="en-US" dirty="0" smtClean="0"/>
-              <a:t>Your UI design must </a:t>
-            </a:r>
-            <a:r>
-              <a:rPr lang="en-US" dirty="0" smtClean="0"/>
-              <a:t>accommodate the </a:t>
+              <a:t>Your UI design must accommodate the </a:t>
             </a:r>
             <a:r>
               <a:rPr lang="en-US" dirty="0" smtClean="0">
@@ -3613,7 +3607,7 @@
     </p:spTree>
     <p:extLst>
       <p:ext uri="{BB962C8B-B14F-4D97-AF65-F5344CB8AC3E}">
-        <p14:creationId xmlns:p14="http://schemas.microsoft.com/office/powerpoint/2010/main" val="2176095641"/>
+        <p14:creationId xmlns:p14="http://schemas.microsoft.com/office/powerpoint/2010/main" xmlns="" val="2176095641"/>
       </p:ext>
     </p:extLst>
   </p:cSld>
@@ -3623,7 +3617,7 @@
   <p:timing>
     <p:tnLst>
       <p:par>
-        <p:cTn xmlns:p14="http://schemas.microsoft.com/office/powerpoint/2010/main" id="1" dur="indefinite" restart="never" nodeType="tmRoot">
+        <p:cTn id="1" dur="indefinite" restart="never" nodeType="tmRoot">
           <p:childTnLst>
             <p:seq concurrent="1" nextAc="seek">
               <p:cTn id="2" dur="indefinite" nodeType="mainSeq">
@@ -4125,7 +4119,7 @@
           <a:blip r:embed="rId2">
             <a:extLst>
               <a:ext uri="{28A0092B-C50C-407E-A947-70E740481C1C}">
-                <a14:useLocalDpi xmlns:a14="http://schemas.microsoft.com/office/drawing/2010/main" val="0"/>
+                <a14:useLocalDpi xmlns:a14="http://schemas.microsoft.com/office/drawing/2010/main" xmlns="" val="0"/>
               </a:ext>
             </a:extLst>
           </a:blip>
@@ -4149,14 +4143,14 @@
           <a:effectLst/>
           <a:extLst>
             <a:ext uri="{909E8E84-426E-40dd-AFC4-6F175D3DCCD1}">
-              <a14:hiddenFill xmlns:a14="http://schemas.microsoft.com/office/drawing/2010/main">
+              <a14:hiddenFill xmlns:a14="http://schemas.microsoft.com/office/drawing/2010/main" xmlns="">
                 <a:solidFill>
                   <a:srgbClr val="FFFFFF"/>
                 </a:solidFill>
               </a14:hiddenFill>
             </a:ext>
             <a:ext uri="{91240B29-F687-4f45-9708-019B960494DF}">
-              <a14:hiddenLine xmlns:a14="http://schemas.microsoft.com/office/drawing/2010/main" w="9525">
+              <a14:hiddenLine xmlns:a14="http://schemas.microsoft.com/office/drawing/2010/main" xmlns="" w="9525">
                 <a:solidFill>
                   <a:srgbClr val="000000"/>
                 </a:solidFill>
@@ -4166,7 +4160,7 @@
               </a14:hiddenLine>
             </a:ext>
             <a:ext uri="{AF507438-7753-43e0-B8FC-AC1667EBCBE1}">
-              <a14:hiddenEffects xmlns:a14="http://schemas.microsoft.com/office/drawing/2010/main">
+              <a14:hiddenEffects xmlns:a14="http://schemas.microsoft.com/office/drawing/2010/main" xmlns="">
                 <a:effectLst>
                   <a:outerShdw blurRad="63500" dist="38099" dir="2700000" algn="ctr" rotWithShape="0">
                     <a:srgbClr val="808080">
@@ -4177,7 +4171,7 @@
               </a14:hiddenEffects>
             </a:ext>
             <a:ext uri="{FAA26D3D-D897-4be2-8F04-BA451C77F1D7}">
-              <ma14:placeholderFlag xmlns:ma14="http://schemas.microsoft.com/office/mac/drawingml/2011/main" val="1"/>
+              <ma14:placeholderFlag xmlns:ma14="http://schemas.microsoft.com/office/mac/drawingml/2011/main" xmlns="" val="1"/>
             </a:ext>
           </a:extLst>
         </p:spPr>
@@ -4259,7 +4253,7 @@
     </p:spTree>
     <p:extLst>
       <p:ext uri="{BB962C8B-B14F-4D97-AF65-F5344CB8AC3E}">
-        <p14:creationId xmlns:p14="http://schemas.microsoft.com/office/powerpoint/2010/main" val="1454977926"/>
+        <p14:creationId xmlns:p14="http://schemas.microsoft.com/office/powerpoint/2010/main" xmlns="" val="1454977926"/>
       </p:ext>
     </p:extLst>
   </p:cSld>
@@ -4269,7 +4263,7 @@
   <p:timing>
     <p:tnLst>
       <p:par>
-        <p:cTn xmlns:p14="http://schemas.microsoft.com/office/powerpoint/2010/main" id="1" dur="indefinite" restart="never" nodeType="tmRoot">
+        <p:cTn id="1" dur="indefinite" restart="never" nodeType="tmRoot">
           <p:childTnLst>
             <p:seq concurrent="1" nextAc="seek">
               <p:cTn id="2" dur="indefinite" nodeType="mainSeq">
@@ -4516,7 +4510,7 @@
           <a:blip r:embed="rId2">
             <a:extLst>
               <a:ext uri="{28A0092B-C50C-407E-A947-70E740481C1C}">
-                <a14:useLocalDpi xmlns:a14="http://schemas.microsoft.com/office/drawing/2010/main" val="0"/>
+                <a14:useLocalDpi xmlns:a14="http://schemas.microsoft.com/office/drawing/2010/main" xmlns="" val="0"/>
               </a:ext>
             </a:extLst>
           </a:blip>
@@ -4540,14 +4534,14 @@
           <a:effectLst/>
           <a:extLst>
             <a:ext uri="{909E8E84-426E-40dd-AFC4-6F175D3DCCD1}">
-              <a14:hiddenFill xmlns:a14="http://schemas.microsoft.com/office/drawing/2010/main">
+              <a14:hiddenFill xmlns:a14="http://schemas.microsoft.com/office/drawing/2010/main" xmlns="">
                 <a:solidFill>
                   <a:srgbClr val="FFFFFF"/>
                 </a:solidFill>
               </a14:hiddenFill>
             </a:ext>
             <a:ext uri="{91240B29-F687-4f45-9708-019B960494DF}">
-              <a14:hiddenLine xmlns:a14="http://schemas.microsoft.com/office/drawing/2010/main" w="9525">
+              <a14:hiddenLine xmlns:a14="http://schemas.microsoft.com/office/drawing/2010/main" xmlns="" w="9525">
                 <a:solidFill>
                   <a:srgbClr val="000000"/>
                 </a:solidFill>
@@ -4557,7 +4551,7 @@
               </a14:hiddenLine>
             </a:ext>
             <a:ext uri="{AF507438-7753-43e0-B8FC-AC1667EBCBE1}">
-              <a14:hiddenEffects xmlns:a14="http://schemas.microsoft.com/office/drawing/2010/main">
+              <a14:hiddenEffects xmlns:a14="http://schemas.microsoft.com/office/drawing/2010/main" xmlns="">
                 <a:effectLst>
                   <a:outerShdw blurRad="63500" dist="38099" dir="2700000" algn="ctr" rotWithShape="0">
                     <a:srgbClr val="808080">
@@ -4568,7 +4562,7 @@
               </a14:hiddenEffects>
             </a:ext>
             <a:ext uri="{FAA26D3D-D897-4be2-8F04-BA451C77F1D7}">
-              <ma14:placeholderFlag xmlns:ma14="http://schemas.microsoft.com/office/mac/drawingml/2011/main" val="1"/>
+              <ma14:placeholderFlag xmlns:ma14="http://schemas.microsoft.com/office/mac/drawingml/2011/main" xmlns="" val="1"/>
             </a:ext>
           </a:extLst>
         </p:spPr>
@@ -4650,7 +4644,7 @@
     </p:spTree>
     <p:extLst>
       <p:ext uri="{BB962C8B-B14F-4D97-AF65-F5344CB8AC3E}">
-        <p14:creationId xmlns:p14="http://schemas.microsoft.com/office/powerpoint/2010/main" val="834926925"/>
+        <p14:creationId xmlns:p14="http://schemas.microsoft.com/office/powerpoint/2010/main" xmlns="" val="834926925"/>
       </p:ext>
     </p:extLst>
   </p:cSld>
@@ -4660,7 +4654,7 @@
   <p:timing>
     <p:tnLst>
       <p:par>
-        <p:cTn xmlns:p14="http://schemas.microsoft.com/office/powerpoint/2010/main" id="1" dur="indefinite" restart="never" nodeType="tmRoot">
+        <p:cTn id="1" dur="indefinite" restart="never" nodeType="tmRoot">
           <p:childTnLst>
             <p:seq concurrent="1" nextAc="seek">
               <p:cTn id="2" dur="indefinite" nodeType="mainSeq">
@@ -4907,7 +4901,7 @@
           <a:blip r:embed="rId2">
             <a:extLst>
               <a:ext uri="{28A0092B-C50C-407E-A947-70E740481C1C}">
-                <a14:useLocalDpi xmlns:a14="http://schemas.microsoft.com/office/drawing/2010/main" val="0"/>
+                <a14:useLocalDpi xmlns:a14="http://schemas.microsoft.com/office/drawing/2010/main" xmlns="" val="0"/>
               </a:ext>
             </a:extLst>
           </a:blip>
@@ -4931,14 +4925,14 @@
           <a:effectLst/>
           <a:extLst>
             <a:ext uri="{909E8E84-426E-40dd-AFC4-6F175D3DCCD1}">
-              <a14:hiddenFill xmlns:a14="http://schemas.microsoft.com/office/drawing/2010/main">
+              <a14:hiddenFill xmlns:a14="http://schemas.microsoft.com/office/drawing/2010/main" xmlns="">
                 <a:solidFill>
                   <a:srgbClr val="FFFFFF"/>
                 </a:solidFill>
               </a14:hiddenFill>
             </a:ext>
             <a:ext uri="{91240B29-F687-4f45-9708-019B960494DF}">
-              <a14:hiddenLine xmlns:a14="http://schemas.microsoft.com/office/drawing/2010/main" w="9525">
+              <a14:hiddenLine xmlns:a14="http://schemas.microsoft.com/office/drawing/2010/main" xmlns="" w="9525">
                 <a:solidFill>
                   <a:srgbClr val="000000"/>
                 </a:solidFill>
@@ -4948,7 +4942,7 @@
               </a14:hiddenLine>
             </a:ext>
             <a:ext uri="{AF507438-7753-43e0-B8FC-AC1667EBCBE1}">
-              <a14:hiddenEffects xmlns:a14="http://schemas.microsoft.com/office/drawing/2010/main">
+              <a14:hiddenEffects xmlns:a14="http://schemas.microsoft.com/office/drawing/2010/main" xmlns="">
                 <a:effectLst>
                   <a:outerShdw blurRad="63500" dist="38099" dir="2700000" algn="ctr" rotWithShape="0">
                     <a:srgbClr val="808080">
@@ -4959,7 +4953,7 @@
               </a14:hiddenEffects>
             </a:ext>
             <a:ext uri="{FAA26D3D-D897-4be2-8F04-BA451C77F1D7}">
-              <ma14:placeholderFlag xmlns:ma14="http://schemas.microsoft.com/office/mac/drawingml/2011/main" val="1"/>
+              <ma14:placeholderFlag xmlns:ma14="http://schemas.microsoft.com/office/mac/drawingml/2011/main" xmlns="" val="1"/>
             </a:ext>
           </a:extLst>
         </p:spPr>
@@ -5041,7 +5035,7 @@
     </p:spTree>
     <p:extLst>
       <p:ext uri="{BB962C8B-B14F-4D97-AF65-F5344CB8AC3E}">
-        <p14:creationId xmlns:p14="http://schemas.microsoft.com/office/powerpoint/2010/main" val="583144055"/>
+        <p14:creationId xmlns:p14="http://schemas.microsoft.com/office/powerpoint/2010/main" xmlns="" val="583144055"/>
       </p:ext>
     </p:extLst>
   </p:cSld>
@@ -5051,7 +5045,7 @@
   <p:timing>
     <p:tnLst>
       <p:par>
-        <p:cTn xmlns:p14="http://schemas.microsoft.com/office/powerpoint/2010/main" id="1" dur="indefinite" restart="never" nodeType="tmRoot">
+        <p:cTn id="1" dur="indefinite" restart="never" nodeType="tmRoot">
           <p:childTnLst>
             <p:seq concurrent="1" nextAc="seek">
               <p:cTn id="2" dur="indefinite" nodeType="mainSeq">
@@ -5315,7 +5309,7 @@
     </p:spTree>
     <p:extLst>
       <p:ext uri="{BB962C8B-B14F-4D97-AF65-F5344CB8AC3E}">
-        <p14:creationId xmlns:p14="http://schemas.microsoft.com/office/powerpoint/2010/main" val="3318815595"/>
+        <p14:creationId xmlns:p14="http://schemas.microsoft.com/office/powerpoint/2010/main" xmlns="" val="3318815595"/>
       </p:ext>
     </p:extLst>
   </p:cSld>
@@ -5325,7 +5319,7 @@
   <p:timing>
     <p:tnLst>
       <p:par>
-        <p:cTn xmlns:p14="http://schemas.microsoft.com/office/powerpoint/2010/main" id="1" dur="indefinite" restart="never" nodeType="tmRoot"/>
+        <p:cTn id="1" dur="indefinite" restart="never" nodeType="tmRoot"/>
       </p:par>
     </p:tnLst>
   </p:timing>
@@ -5560,7 +5554,7 @@
     </p:spTree>
     <p:extLst>
       <p:ext uri="{BB962C8B-B14F-4D97-AF65-F5344CB8AC3E}">
-        <p14:creationId xmlns:p14="http://schemas.microsoft.com/office/powerpoint/2010/main" val="4169041645"/>
+        <p14:creationId xmlns:p14="http://schemas.microsoft.com/office/powerpoint/2010/main" xmlns="" val="4169041645"/>
       </p:ext>
     </p:extLst>
   </p:cSld>
@@ -5570,7 +5564,7 @@
   <p:timing>
     <p:tnLst>
       <p:par>
-        <p:cTn xmlns:p14="http://schemas.microsoft.com/office/powerpoint/2010/main" id="1" dur="indefinite" restart="never" nodeType="tmRoot">
+        <p:cTn id="1" dur="indefinite" restart="never" nodeType="tmRoot">
           <p:childTnLst>
             <p:seq concurrent="1" nextAc="seek">
               <p:cTn id="2" dur="indefinite" nodeType="mainSeq">
@@ -5997,14 +5991,14 @@
             <a:effectLst/>
             <a:extLst>
               <a:ext uri="{909E8E84-426E-40dd-AFC4-6F175D3DCCD1}">
-                <a14:hiddenFill xmlns:a14="http://schemas.microsoft.com/office/drawing/2010/main">
+                <a14:hiddenFill xmlns:a14="http://schemas.microsoft.com/office/drawing/2010/main" xmlns="">
                   <a:solidFill>
                     <a:schemeClr val="accent1"/>
                   </a:solidFill>
                 </a14:hiddenFill>
               </a:ext>
               <a:ext uri="{AF507438-7753-43e0-B8FC-AC1667EBCBE1}">
-                <a14:hiddenEffects xmlns:a14="http://schemas.microsoft.com/office/drawing/2010/main">
+                <a14:hiddenEffects xmlns:a14="http://schemas.microsoft.com/office/drawing/2010/main" xmlns="">
                   <a:effectLst>
                     <a:outerShdw blurRad="63500" dist="38099" dir="2700000" algn="ctr" rotWithShape="0">
                       <a:schemeClr val="bg2">
@@ -6051,14 +6045,14 @@
             <a:effectLst/>
             <a:extLst>
               <a:ext uri="{909E8E84-426E-40dd-AFC4-6F175D3DCCD1}">
-                <a14:hiddenFill xmlns:a14="http://schemas.microsoft.com/office/drawing/2010/main">
+                <a14:hiddenFill xmlns:a14="http://schemas.microsoft.com/office/drawing/2010/main" xmlns="">
                   <a:solidFill>
                     <a:schemeClr val="accent1"/>
                   </a:solidFill>
                 </a14:hiddenFill>
               </a:ext>
               <a:ext uri="{91240B29-F687-4f45-9708-019B960494DF}">
-                <a14:hiddenLine xmlns:a14="http://schemas.microsoft.com/office/drawing/2010/main" w="9525">
+                <a14:hiddenLine xmlns:a14="http://schemas.microsoft.com/office/drawing/2010/main" xmlns="" w="9525">
                   <a:solidFill>
                     <a:schemeClr val="tx1"/>
                   </a:solidFill>
@@ -6068,7 +6062,7 @@
                 </a14:hiddenLine>
               </a:ext>
               <a:ext uri="{AF507438-7753-43e0-B8FC-AC1667EBCBE1}">
-                <a14:hiddenEffects xmlns:a14="http://schemas.microsoft.com/office/drawing/2010/main">
+                <a14:hiddenEffects xmlns:a14="http://schemas.microsoft.com/office/drawing/2010/main" xmlns="">
                   <a:effectLst>
                     <a:outerShdw blurRad="63500" dist="38099" dir="2700000" algn="ctr" rotWithShape="0">
                       <a:schemeClr val="bg2">
@@ -6106,7 +6100,7 @@
     </p:spTree>
     <p:extLst>
       <p:ext uri="{BB962C8B-B14F-4D97-AF65-F5344CB8AC3E}">
-        <p14:creationId xmlns:p14="http://schemas.microsoft.com/office/powerpoint/2010/main" val="1949927720"/>
+        <p14:creationId xmlns:p14="http://schemas.microsoft.com/office/powerpoint/2010/main" xmlns="" val="1949927720"/>
       </p:ext>
     </p:extLst>
   </p:cSld>
@@ -6116,7 +6110,7 @@
   <p:timing>
     <p:tnLst>
       <p:par>
-        <p:cTn xmlns:p14="http://schemas.microsoft.com/office/powerpoint/2010/main" id="1" dur="indefinite" restart="never" nodeType="tmRoot">
+        <p:cTn id="1" dur="indefinite" restart="never" nodeType="tmRoot">
           <p:childTnLst>
             <p:seq concurrent="1" nextAc="seek">
               <p:cTn id="2" dur="indefinite" nodeType="mainSeq">
@@ -6968,7 +6962,7 @@
     </p:spTree>
     <p:extLst>
       <p:ext uri="{BB962C8B-B14F-4D97-AF65-F5344CB8AC3E}">
-        <p14:creationId xmlns:p14="http://schemas.microsoft.com/office/powerpoint/2010/main" val="981206306"/>
+        <p14:creationId xmlns:p14="http://schemas.microsoft.com/office/powerpoint/2010/main" xmlns="" val="981206306"/>
       </p:ext>
     </p:extLst>
   </p:cSld>
@@ -6978,7 +6972,7 @@
   <p:timing>
     <p:tnLst>
       <p:par>
-        <p:cTn xmlns:p14="http://schemas.microsoft.com/office/powerpoint/2010/main" id="1" dur="indefinite" restart="never" nodeType="tmRoot">
+        <p:cTn id="1" dur="indefinite" restart="never" nodeType="tmRoot">
           <p:childTnLst>
             <p:seq concurrent="1" nextAc="seek">
               <p:cTn id="2" dur="indefinite" nodeType="mainSeq">
@@ -7651,7 +7645,7 @@
     </p:spTree>
     <p:extLst>
       <p:ext uri="{BB962C8B-B14F-4D97-AF65-F5344CB8AC3E}">
-        <p14:creationId xmlns:p14="http://schemas.microsoft.com/office/powerpoint/2010/main" val="2336700765"/>
+        <p14:creationId xmlns:p14="http://schemas.microsoft.com/office/powerpoint/2010/main" xmlns="" val="2336700765"/>
       </p:ext>
     </p:extLst>
   </p:cSld>
@@ -7661,7 +7655,7 @@
   <p:timing>
     <p:tnLst>
       <p:par>
-        <p:cTn xmlns:p14="http://schemas.microsoft.com/office/powerpoint/2010/main" id="1" dur="indefinite" restart="never" nodeType="tmRoot">
+        <p:cTn id="1" dur="indefinite" restart="never" nodeType="tmRoot">
           <p:childTnLst>
             <p:seq concurrent="1" nextAc="seek">
               <p:cTn id="2" dur="indefinite" nodeType="mainSeq">
@@ -7911,11 +7905,7 @@
           <a:p>
             <a:r>
               <a:rPr lang="en-US" dirty="0" smtClean="0"/>
-              <a:t>Reminders: </a:t>
-            </a:r>
-            <a:r>
-              <a:rPr lang="en-US" dirty="0" smtClean="0"/>
-              <a:t>As Soon as Possible</a:t>
+              <a:t>Reminders: As Soon as Possible</a:t>
             </a:r>
             <a:endParaRPr lang="en-US" dirty="0"/>
           </a:p>
@@ -7938,11 +7928,7 @@
           <a:p>
             <a:r>
               <a:rPr lang="en-US" dirty="0" smtClean="0"/>
-              <a:t>Form teams</a:t>
-            </a:r>
-            <a:r>
-              <a:rPr lang="en-US" dirty="0" smtClean="0"/>
-              <a:t>.</a:t>
+              <a:t>Form teams.</a:t>
             </a:r>
           </a:p>
           <a:p>
@@ -7983,11 +7969,7 @@
             </a:br>
             <a:r>
               <a:rPr lang="en-US" smtClean="0"/>
-              <a:t>imagined </a:t>
-            </a:r>
-            <a:r>
-              <a:rPr lang="en-US" smtClean="0"/>
-              <a:t>web application</a:t>
+              <a:t>imagined web application</a:t>
             </a:r>
             <a:r>
               <a:rPr lang="en-US" dirty="0" smtClean="0"/>
@@ -8045,7 +8027,7 @@
     </p:spTree>
     <p:extLst>
       <p:ext uri="{BB962C8B-B14F-4D97-AF65-F5344CB8AC3E}">
-        <p14:creationId xmlns:p14="http://schemas.microsoft.com/office/powerpoint/2010/main" val="2230909407"/>
+        <p14:creationId xmlns:p14="http://schemas.microsoft.com/office/powerpoint/2010/main" xmlns="" val="2230909407"/>
       </p:ext>
     </p:extLst>
   </p:cSld>
@@ -8055,7 +8037,7 @@
   <p:timing>
     <p:tnLst>
       <p:par>
-        <p:cTn xmlns:p14="http://schemas.microsoft.com/office/powerpoint/2010/main" id="1" dur="indefinite" restart="never" nodeType="tmRoot"/>
+        <p:cTn id="1" dur="indefinite" restart="never" nodeType="tmRoot"/>
       </p:par>
     </p:tnLst>
   </p:timing>
@@ -8312,7 +8294,7 @@
     </p:spTree>
     <p:extLst>
       <p:ext uri="{BB962C8B-B14F-4D97-AF65-F5344CB8AC3E}">
-        <p14:creationId xmlns:p14="http://schemas.microsoft.com/office/powerpoint/2010/main" val="2901604243"/>
+        <p14:creationId xmlns:p14="http://schemas.microsoft.com/office/powerpoint/2010/main" xmlns="" val="2901604243"/>
       </p:ext>
     </p:extLst>
   </p:cSld>
@@ -8322,7 +8304,7 @@
   <p:timing>
     <p:tnLst>
       <p:par>
-        <p:cTn xmlns:p14="http://schemas.microsoft.com/office/powerpoint/2010/main" id="1" dur="indefinite" restart="never" nodeType="tmRoot">
+        <p:cTn id="1" dur="indefinite" restart="never" nodeType="tmRoot">
           <p:childTnLst>
             <p:seq concurrent="1" nextAc="seek">
               <p:cTn id="2" dur="indefinite" nodeType="mainSeq">
@@ -8988,7 +8970,7 @@
     </p:spTree>
     <p:extLst>
       <p:ext uri="{BB962C8B-B14F-4D97-AF65-F5344CB8AC3E}">
-        <p14:creationId xmlns:p14="http://schemas.microsoft.com/office/powerpoint/2010/main" val="1219802964"/>
+        <p14:creationId xmlns:p14="http://schemas.microsoft.com/office/powerpoint/2010/main" xmlns="" val="1219802964"/>
       </p:ext>
     </p:extLst>
   </p:cSld>
@@ -8998,7 +8980,7 @@
   <p:timing>
     <p:tnLst>
       <p:par>
-        <p:cTn xmlns:p14="http://schemas.microsoft.com/office/powerpoint/2010/main" id="1" dur="indefinite" restart="never" nodeType="tmRoot">
+        <p:cTn id="1" dur="indefinite" restart="never" nodeType="tmRoot">
           <p:childTnLst>
             <p:seq concurrent="1" nextAc="seek">
               <p:cTn id="2" dur="indefinite" nodeType="mainSeq">
@@ -9539,7 +9521,7 @@
     </p:spTree>
     <p:extLst>
       <p:ext uri="{BB962C8B-B14F-4D97-AF65-F5344CB8AC3E}">
-        <p14:creationId xmlns:p14="http://schemas.microsoft.com/office/powerpoint/2010/main" val="3210854738"/>
+        <p14:creationId xmlns:p14="http://schemas.microsoft.com/office/powerpoint/2010/main" xmlns="" val="3210854738"/>
       </p:ext>
     </p:extLst>
   </p:cSld>
@@ -9549,7 +9531,7 @@
   <p:timing>
     <p:tnLst>
       <p:par>
-        <p:cTn xmlns:p14="http://schemas.microsoft.com/office/powerpoint/2010/main" id="1" dur="indefinite" restart="never" nodeType="tmRoot">
+        <p:cTn id="1" dur="indefinite" restart="never" nodeType="tmRoot">
           <p:childTnLst>
             <p:seq concurrent="1" nextAc="seek">
               <p:cTn id="2" dur="indefinite" nodeType="mainSeq">
@@ -9831,7 +9813,7 @@
     </p:spTree>
     <p:extLst>
       <p:ext uri="{BB962C8B-B14F-4D97-AF65-F5344CB8AC3E}">
-        <p14:creationId xmlns:p14="http://schemas.microsoft.com/office/powerpoint/2010/main" val="3412399470"/>
+        <p14:creationId xmlns:p14="http://schemas.microsoft.com/office/powerpoint/2010/main" xmlns="" val="3412399470"/>
       </p:ext>
     </p:extLst>
   </p:cSld>
@@ -9841,7 +9823,7 @@
   <p:timing>
     <p:tnLst>
       <p:par>
-        <p:cTn xmlns:p14="http://schemas.microsoft.com/office/powerpoint/2010/main" id="1" dur="indefinite" restart="never" nodeType="tmRoot">
+        <p:cTn id="1" dur="indefinite" restart="never" nodeType="tmRoot">
           <p:childTnLst>
             <p:seq concurrent="1" nextAc="seek">
               <p:cTn id="2" dur="indefinite" nodeType="mainSeq">
@@ -10215,7 +10197,7 @@
           <a:blip r:embed="rId2">
             <a:extLst>
               <a:ext uri="{28A0092B-C50C-407E-A947-70E740481C1C}">
-                <a14:useLocalDpi xmlns:a14="http://schemas.microsoft.com/office/drawing/2010/main" val="0"/>
+                <a14:useLocalDpi xmlns:a14="http://schemas.microsoft.com/office/drawing/2010/main" xmlns="" val="0"/>
               </a:ext>
             </a:extLst>
           </a:blip>
@@ -10239,14 +10221,14 @@
           <a:effectLst/>
           <a:extLst>
             <a:ext uri="{909E8E84-426E-40dd-AFC4-6F175D3DCCD1}">
-              <a14:hiddenFill xmlns:a14="http://schemas.microsoft.com/office/drawing/2010/main">
+              <a14:hiddenFill xmlns:a14="http://schemas.microsoft.com/office/drawing/2010/main" xmlns="">
                 <a:solidFill>
                   <a:srgbClr val="FFFFFF"/>
                 </a:solidFill>
               </a14:hiddenFill>
             </a:ext>
             <a:ext uri="{91240B29-F687-4f45-9708-019B960494DF}">
-              <a14:hiddenLine xmlns:a14="http://schemas.microsoft.com/office/drawing/2010/main" w="9525">
+              <a14:hiddenLine xmlns:a14="http://schemas.microsoft.com/office/drawing/2010/main" xmlns="" w="9525">
                 <a:solidFill>
                   <a:srgbClr val="000000"/>
                 </a:solidFill>
@@ -10256,7 +10238,7 @@
               </a14:hiddenLine>
             </a:ext>
             <a:ext uri="{AF507438-7753-43e0-B8FC-AC1667EBCBE1}">
-              <a14:hiddenEffects xmlns:a14="http://schemas.microsoft.com/office/drawing/2010/main">
+              <a14:hiddenEffects xmlns:a14="http://schemas.microsoft.com/office/drawing/2010/main" xmlns="">
                 <a:effectLst>
                   <a:outerShdw blurRad="63500" dist="38099" dir="2700000" algn="ctr" rotWithShape="0">
                     <a:srgbClr val="808080">
@@ -10267,7 +10249,7 @@
               </a14:hiddenEffects>
             </a:ext>
             <a:ext uri="{FAA26D3D-D897-4be2-8F04-BA451C77F1D7}">
-              <ma14:placeholderFlag xmlns:ma14="http://schemas.microsoft.com/office/mac/drawingml/2011/main" val="1"/>
+              <ma14:placeholderFlag xmlns:ma14="http://schemas.microsoft.com/office/mac/drawingml/2011/main" xmlns="" val="1"/>
             </a:ext>
           </a:extLst>
         </p:spPr>
@@ -10349,7 +10331,7 @@
     </p:spTree>
     <p:extLst>
       <p:ext uri="{BB962C8B-B14F-4D97-AF65-F5344CB8AC3E}">
-        <p14:creationId xmlns:p14="http://schemas.microsoft.com/office/powerpoint/2010/main" val="3209376308"/>
+        <p14:creationId xmlns:p14="http://schemas.microsoft.com/office/powerpoint/2010/main" xmlns="" val="3209376308"/>
       </p:ext>
     </p:extLst>
   </p:cSld>
@@ -10359,7 +10341,7 @@
   <p:timing>
     <p:tnLst>
       <p:par>
-        <p:cTn xmlns:p14="http://schemas.microsoft.com/office/powerpoint/2010/main" id="1" dur="indefinite" restart="never" nodeType="tmRoot">
+        <p:cTn id="1" dur="indefinite" restart="never" nodeType="tmRoot">
           <p:childTnLst>
             <p:seq concurrent="1" nextAc="seek">
               <p:cTn id="2" dur="indefinite" nodeType="mainSeq">
@@ -10654,7 +10636,7 @@
     </p:spTree>
     <p:extLst>
       <p:ext uri="{BB962C8B-B14F-4D97-AF65-F5344CB8AC3E}">
-        <p14:creationId xmlns:p14="http://schemas.microsoft.com/office/powerpoint/2010/main" val="1980565107"/>
+        <p14:creationId xmlns:p14="http://schemas.microsoft.com/office/powerpoint/2010/main" xmlns="" val="1980565107"/>
       </p:ext>
     </p:extLst>
   </p:cSld>
@@ -10664,7 +10646,7 @@
   <p:timing>
     <p:tnLst>
       <p:par>
-        <p:cTn xmlns:p14="http://schemas.microsoft.com/office/powerpoint/2010/main" id="1" dur="indefinite" restart="never" nodeType="tmRoot">
+        <p:cTn id="1" dur="indefinite" restart="never" nodeType="tmRoot">
           <p:childTnLst>
             <p:seq concurrent="1" nextAc="seek">
               <p:cTn id="2" dur="indefinite" nodeType="mainSeq">
@@ -10955,7 +10937,7 @@
     </p:spTree>
     <p:extLst>
       <p:ext uri="{BB962C8B-B14F-4D97-AF65-F5344CB8AC3E}">
-        <p14:creationId xmlns:p14="http://schemas.microsoft.com/office/powerpoint/2010/main" val="2974113508"/>
+        <p14:creationId xmlns:p14="http://schemas.microsoft.com/office/powerpoint/2010/main" xmlns="" val="2974113508"/>
       </p:ext>
     </p:extLst>
   </p:cSld>
@@ -10965,7 +10947,7 @@
   <p:timing>
     <p:tnLst>
       <p:par>
-        <p:cTn xmlns:p14="http://schemas.microsoft.com/office/powerpoint/2010/main" id="1" dur="indefinite" restart="never" nodeType="tmRoot">
+        <p:cTn id="1" dur="indefinite" restart="never" nodeType="tmRoot">
           <p:childTnLst>
             <p:seq concurrent="1" nextAc="seek">
               <p:cTn id="2" dur="indefinite" nodeType="mainSeq">
@@ -11347,7 +11329,7 @@
           <a:blip r:embed="rId2">
             <a:extLst>
               <a:ext uri="{28A0092B-C50C-407E-A947-70E740481C1C}">
-                <a14:useLocalDpi xmlns:a14="http://schemas.microsoft.com/office/drawing/2010/main" val="0"/>
+                <a14:useLocalDpi xmlns:a14="http://schemas.microsoft.com/office/drawing/2010/main" xmlns="" val="0"/>
               </a:ext>
             </a:extLst>
           </a:blip>
@@ -11371,14 +11353,14 @@
           <a:effectLst/>
           <a:extLst>
             <a:ext uri="{909E8E84-426E-40dd-AFC4-6F175D3DCCD1}">
-              <a14:hiddenFill xmlns:a14="http://schemas.microsoft.com/office/drawing/2010/main">
+              <a14:hiddenFill xmlns:a14="http://schemas.microsoft.com/office/drawing/2010/main" xmlns="">
                 <a:solidFill>
                   <a:srgbClr val="FFFFFF"/>
                 </a:solidFill>
               </a14:hiddenFill>
             </a:ext>
             <a:ext uri="{91240B29-F687-4f45-9708-019B960494DF}">
-              <a14:hiddenLine xmlns:a14="http://schemas.microsoft.com/office/drawing/2010/main" w="9525">
+              <a14:hiddenLine xmlns:a14="http://schemas.microsoft.com/office/drawing/2010/main" xmlns="" w="9525">
                 <a:solidFill>
                   <a:srgbClr val="000000"/>
                 </a:solidFill>
@@ -11388,7 +11370,7 @@
               </a14:hiddenLine>
             </a:ext>
             <a:ext uri="{AF507438-7753-43e0-B8FC-AC1667EBCBE1}">
-              <a14:hiddenEffects xmlns:a14="http://schemas.microsoft.com/office/drawing/2010/main">
+              <a14:hiddenEffects xmlns:a14="http://schemas.microsoft.com/office/drawing/2010/main" xmlns="">
                 <a:effectLst>
                   <a:outerShdw blurRad="63500" dist="38099" dir="2700000" algn="ctr" rotWithShape="0">
                     <a:srgbClr val="808080">
@@ -11399,7 +11381,7 @@
               </a14:hiddenEffects>
             </a:ext>
             <a:ext uri="{FAA26D3D-D897-4be2-8F04-BA451C77F1D7}">
-              <ma14:placeholderFlag xmlns:ma14="http://schemas.microsoft.com/office/mac/drawingml/2011/main" val="1"/>
+              <ma14:placeholderFlag xmlns:ma14="http://schemas.microsoft.com/office/mac/drawingml/2011/main" xmlns="" val="1"/>
             </a:ext>
           </a:extLst>
         </p:spPr>
@@ -11481,7 +11463,7 @@
     </p:spTree>
     <p:extLst>
       <p:ext uri="{BB962C8B-B14F-4D97-AF65-F5344CB8AC3E}">
-        <p14:creationId xmlns:p14="http://schemas.microsoft.com/office/powerpoint/2010/main" val="2744431961"/>
+        <p14:creationId xmlns:p14="http://schemas.microsoft.com/office/powerpoint/2010/main" xmlns="" val="2744431961"/>
       </p:ext>
     </p:extLst>
   </p:cSld>
@@ -11491,7 +11473,7 @@
   <p:timing>
     <p:tnLst>
       <p:par>
-        <p:cTn xmlns:p14="http://schemas.microsoft.com/office/powerpoint/2010/main" id="1" dur="indefinite" restart="never" nodeType="tmRoot"/>
+        <p:cTn id="1" dur="indefinite" restart="never" nodeType="tmRoot"/>
       </p:par>
     </p:tnLst>
   </p:timing>
@@ -11690,7 +11672,7 @@
     </p:spTree>
     <p:extLst>
       <p:ext uri="{BB962C8B-B14F-4D97-AF65-F5344CB8AC3E}">
-        <p14:creationId xmlns:p14="http://schemas.microsoft.com/office/powerpoint/2010/main" val="4018901260"/>
+        <p14:creationId xmlns:p14="http://schemas.microsoft.com/office/powerpoint/2010/main" xmlns="" val="4018901260"/>
       </p:ext>
     </p:extLst>
   </p:cSld>
@@ -11700,7 +11682,7 @@
   <p:timing>
     <p:tnLst>
       <p:par>
-        <p:cTn xmlns:p14="http://schemas.microsoft.com/office/powerpoint/2010/main" id="1" dur="indefinite" restart="never" nodeType="tmRoot">
+        <p:cTn id="1" dur="indefinite" restart="never" nodeType="tmRoot">
           <p:childTnLst>
             <p:seq concurrent="1" nextAc="seek">
               <p:cTn id="2" dur="indefinite" nodeType="mainSeq">
@@ -11945,7 +11927,7 @@
     </p:spTree>
     <p:extLst>
       <p:ext uri="{BB962C8B-B14F-4D97-AF65-F5344CB8AC3E}">
-        <p14:creationId xmlns:p14="http://schemas.microsoft.com/office/powerpoint/2010/main" val="1007590568"/>
+        <p14:creationId xmlns:p14="http://schemas.microsoft.com/office/powerpoint/2010/main" xmlns="" val="1007590568"/>
       </p:ext>
     </p:extLst>
   </p:cSld>
@@ -11955,7 +11937,7 @@
   <p:timing>
     <p:tnLst>
       <p:par>
-        <p:cTn xmlns:p14="http://schemas.microsoft.com/office/powerpoint/2010/main" id="1" dur="indefinite" restart="never" nodeType="tmRoot">
+        <p:cTn id="1" dur="indefinite" restart="never" nodeType="tmRoot">
           <p:childTnLst>
             <p:seq concurrent="1" nextAc="seek">
               <p:cTn id="2" dur="indefinite" nodeType="mainSeq">
@@ -12476,7 +12458,7 @@
     </p:spTree>
     <p:extLst>
       <p:ext uri="{BB962C8B-B14F-4D97-AF65-F5344CB8AC3E}">
-        <p14:creationId xmlns:p14="http://schemas.microsoft.com/office/powerpoint/2010/main" val="1516044806"/>
+        <p14:creationId xmlns:p14="http://schemas.microsoft.com/office/powerpoint/2010/main" xmlns="" val="1516044806"/>
       </p:ext>
     </p:extLst>
   </p:cSld>
@@ -12486,7 +12468,7 @@
   <p:timing>
     <p:tnLst>
       <p:par>
-        <p:cTn xmlns:p14="http://schemas.microsoft.com/office/powerpoint/2010/main" id="1" dur="indefinite" restart="never" nodeType="tmRoot">
+        <p:cTn id="1" dur="indefinite" restart="never" nodeType="tmRoot">
           <p:childTnLst>
             <p:seq concurrent="1" nextAc="seek">
               <p:cTn id="2" dur="indefinite" nodeType="mainSeq">
@@ -12629,11 +12611,7 @@
           <a:p>
             <a:r>
               <a:rPr lang="en-US" dirty="0" smtClean="0"/>
-              <a:t>We’ll use </a:t>
-            </a:r>
-            <a:r>
-              <a:rPr lang="en-US" dirty="0" smtClean="0"/>
-              <a:t>the teams’ </a:t>
+              <a:t>We’ll use the teams’ </a:t>
             </a:r>
             <a:r>
               <a:rPr lang="en-US" dirty="0" smtClean="0">
@@ -12687,13 +12665,8 @@
           <a:p>
             <a:r>
               <a:rPr lang="en-US" dirty="0" smtClean="0"/>
-              <a:t>Details </a:t>
-            </a:r>
-            <a:r>
-              <a:rPr lang="en-US" dirty="0" smtClean="0"/>
-              <a:t>on Thursday!</a:t>
-            </a:r>
-            <a:endParaRPr lang="en-US" dirty="0" smtClean="0"/>
+              <a:t>Details on Thursday!</a:t>
+            </a:r>
           </a:p>
         </p:txBody>
       </p:sp>
@@ -12724,7 +12697,7 @@
     </p:spTree>
     <p:extLst>
       <p:ext uri="{BB962C8B-B14F-4D97-AF65-F5344CB8AC3E}">
-        <p14:creationId xmlns:p14="http://schemas.microsoft.com/office/powerpoint/2010/main" val="2137359377"/>
+        <p14:creationId xmlns:p14="http://schemas.microsoft.com/office/powerpoint/2010/main" xmlns="" val="2137359377"/>
       </p:ext>
     </p:extLst>
   </p:cSld>
@@ -12734,7 +12707,7 @@
   <p:timing>
     <p:tnLst>
       <p:par>
-        <p:cTn xmlns:p14="http://schemas.microsoft.com/office/powerpoint/2010/main" id="1" dur="indefinite" restart="never" nodeType="tmRoot">
+        <p:cTn id="1" dur="indefinite" restart="never" nodeType="tmRoot">
           <p:childTnLst>
             <p:seq concurrent="1" nextAc="seek">
               <p:cTn id="2" dur="indefinite" nodeType="mainSeq">
@@ -12963,7 +12936,7 @@
     </p:spTree>
     <p:extLst>
       <p:ext uri="{BB962C8B-B14F-4D97-AF65-F5344CB8AC3E}">
-        <p14:creationId xmlns:p14="http://schemas.microsoft.com/office/powerpoint/2010/main" val="2789906888"/>
+        <p14:creationId xmlns:p14="http://schemas.microsoft.com/office/powerpoint/2010/main" xmlns="" val="2789906888"/>
       </p:ext>
     </p:extLst>
   </p:cSld>
@@ -12973,7 +12946,7 @@
   <p:timing>
     <p:tnLst>
       <p:par>
-        <p:cTn xmlns:p14="http://schemas.microsoft.com/office/powerpoint/2010/main" id="1" dur="indefinite" restart="never" nodeType="tmRoot"/>
+        <p:cTn id="1" dur="indefinite" restart="never" nodeType="tmRoot"/>
       </p:par>
     </p:tnLst>
   </p:timing>
@@ -13114,7 +13087,7 @@
     </p:spTree>
     <p:extLst>
       <p:ext uri="{BB962C8B-B14F-4D97-AF65-F5344CB8AC3E}">
-        <p14:creationId xmlns:p14="http://schemas.microsoft.com/office/powerpoint/2010/main" val="3294944684"/>
+        <p14:creationId xmlns:p14="http://schemas.microsoft.com/office/powerpoint/2010/main" xmlns="" val="3294944684"/>
       </p:ext>
     </p:extLst>
   </p:cSld>
@@ -13124,7 +13097,7 @@
   <p:timing>
     <p:tnLst>
       <p:par>
-        <p:cTn xmlns:p14="http://schemas.microsoft.com/office/powerpoint/2010/main" id="1" dur="indefinite" restart="never" nodeType="tmRoot"/>
+        <p:cTn id="1" dur="indefinite" restart="never" nodeType="tmRoot"/>
       </p:par>
     </p:tnLst>
   </p:timing>
@@ -13219,14 +13192,14 @@
           <a:effectLst/>
           <a:extLst>
             <a:ext uri="{909E8E84-426E-40dd-AFC4-6F175D3DCCD1}">
-              <a14:hiddenFill xmlns:a14="http://schemas.microsoft.com/office/drawing/2010/main">
+              <a14:hiddenFill xmlns:a14="http://schemas.microsoft.com/office/drawing/2010/main" xmlns="">
                 <a:solidFill>
                   <a:schemeClr val="accent1"/>
                 </a:solidFill>
               </a14:hiddenFill>
             </a:ext>
             <a:ext uri="{AF507438-7753-43e0-B8FC-AC1667EBCBE1}">
-              <a14:hiddenEffects xmlns:a14="http://schemas.microsoft.com/office/drawing/2010/main">
+              <a14:hiddenEffects xmlns:a14="http://schemas.microsoft.com/office/drawing/2010/main" xmlns="">
                 <a:effectLst>
                   <a:outerShdw blurRad="63500" dist="38099" dir="2700000" algn="ctr" rotWithShape="0">
                     <a:schemeClr val="bg2">
@@ -13258,7 +13231,7 @@
     </p:spTree>
     <p:extLst>
       <p:ext uri="{BB962C8B-B14F-4D97-AF65-F5344CB8AC3E}">
-        <p14:creationId xmlns:p14="http://schemas.microsoft.com/office/powerpoint/2010/main" val="1902660797"/>
+        <p14:creationId xmlns:p14="http://schemas.microsoft.com/office/powerpoint/2010/main" xmlns="" val="1902660797"/>
       </p:ext>
     </p:extLst>
   </p:cSld>
@@ -13268,7 +13241,7 @@
   <p:timing>
     <p:tnLst>
       <p:par>
-        <p:cTn xmlns:p14="http://schemas.microsoft.com/office/powerpoint/2010/main" id="1" dur="indefinite" restart="never" nodeType="tmRoot"/>
+        <p:cTn id="1" dur="indefinite" restart="never" nodeType="tmRoot"/>
       </p:par>
     </p:tnLst>
   </p:timing>
@@ -13398,7 +13371,7 @@
           <a:blip r:embed="rId2">
             <a:extLst>
               <a:ext uri="{28A0092B-C50C-407E-A947-70E740481C1C}">
-                <a14:useLocalDpi xmlns:a14="http://schemas.microsoft.com/office/drawing/2010/main" val="0"/>
+                <a14:useLocalDpi xmlns:a14="http://schemas.microsoft.com/office/drawing/2010/main" xmlns="" val="0"/>
               </a:ext>
             </a:extLst>
           </a:blip>
@@ -13418,7 +13391,7 @@
           <a:noFill/>
           <a:extLst>
             <a:ext uri="{909E8E84-426E-40dd-AFC4-6F175D3DCCD1}">
-              <a14:hiddenFill xmlns:a14="http://schemas.microsoft.com/office/drawing/2010/main">
+              <a14:hiddenFill xmlns:a14="http://schemas.microsoft.com/office/drawing/2010/main" xmlns="">
                 <a:solidFill>
                   <a:srgbClr val="FFFFFF"/>
                 </a:solidFill>
@@ -13430,7 +13403,7 @@
     </p:spTree>
     <p:extLst>
       <p:ext uri="{BB962C8B-B14F-4D97-AF65-F5344CB8AC3E}">
-        <p14:creationId xmlns:p14="http://schemas.microsoft.com/office/powerpoint/2010/main" val="2184614968"/>
+        <p14:creationId xmlns:p14="http://schemas.microsoft.com/office/powerpoint/2010/main" xmlns="" val="2184614968"/>
       </p:ext>
     </p:extLst>
   </p:cSld>
@@ -13440,7 +13413,7 @@
   <p:timing>
     <p:tnLst>
       <p:par>
-        <p:cTn xmlns:p14="http://schemas.microsoft.com/office/powerpoint/2010/main" id="1" dur="indefinite" restart="never" nodeType="tmRoot">
+        <p:cTn id="1" dur="indefinite" restart="never" nodeType="tmRoot">
           <p:childTnLst>
             <p:seq concurrent="1" nextAc="seek">
               <p:cTn id="2" dur="indefinite" nodeType="mainSeq">
@@ -13612,7 +13585,7 @@
           <a:blip r:embed="rId2">
             <a:extLst>
               <a:ext uri="{28A0092B-C50C-407E-A947-70E740481C1C}">
-                <a14:useLocalDpi xmlns:a14="http://schemas.microsoft.com/office/drawing/2010/main" val="0"/>
+                <a14:useLocalDpi xmlns:a14="http://schemas.microsoft.com/office/drawing/2010/main" xmlns="" val="0"/>
               </a:ext>
             </a:extLst>
           </a:blip>
@@ -13630,14 +13603,14 @@
           <a:ln/>
           <a:extLst>
             <a:ext uri="{909E8E84-426E-40dd-AFC4-6F175D3DCCD1}">
-              <a14:hiddenFill xmlns:a14="http://schemas.microsoft.com/office/drawing/2010/main">
+              <a14:hiddenFill xmlns:a14="http://schemas.microsoft.com/office/drawing/2010/main" xmlns="">
                 <a:solidFill>
                   <a:srgbClr val="FFFFFF"/>
                 </a:solidFill>
               </a14:hiddenFill>
             </a:ext>
             <a:ext uri="{91240B29-F687-4f45-9708-019B960494DF}">
-              <a14:hiddenLine xmlns:a14="http://schemas.microsoft.com/office/drawing/2010/main" w="9525">
+              <a14:hiddenLine xmlns:a14="http://schemas.microsoft.com/office/drawing/2010/main" xmlns="" w="9525">
                 <a:solidFill>
                   <a:srgbClr val="000000"/>
                 </a:solidFill>
@@ -13647,7 +13620,7 @@
               </a14:hiddenLine>
             </a:ext>
             <a:ext uri="{AF507438-7753-43e0-B8FC-AC1667EBCBE1}">
-              <a14:hiddenEffects xmlns:a14="http://schemas.microsoft.com/office/drawing/2010/main">
+              <a14:hiddenEffects xmlns:a14="http://schemas.microsoft.com/office/drawing/2010/main" xmlns="">
                 <a:effectLst>
                   <a:outerShdw blurRad="63500" dist="38099" dir="2700000" algn="ctr" rotWithShape="0">
                     <a:srgbClr val="808080">
@@ -13737,7 +13710,7 @@
     </p:spTree>
     <p:extLst>
       <p:ext uri="{BB962C8B-B14F-4D97-AF65-F5344CB8AC3E}">
-        <p14:creationId xmlns:p14="http://schemas.microsoft.com/office/powerpoint/2010/main" val="521523757"/>
+        <p14:creationId xmlns:p14="http://schemas.microsoft.com/office/powerpoint/2010/main" xmlns="" val="521523757"/>
       </p:ext>
     </p:extLst>
   </p:cSld>
@@ -13747,7 +13720,7 @@
   <p:timing>
     <p:tnLst>
       <p:par>
-        <p:cTn xmlns:p14="http://schemas.microsoft.com/office/powerpoint/2010/main" id="1" dur="indefinite" restart="never" nodeType="tmRoot"/>
+        <p:cTn id="1" dur="indefinite" restart="never" nodeType="tmRoot"/>
       </p:par>
     </p:tnLst>
   </p:timing>
@@ -13825,13 +13798,8 @@
             <a:pPr lvl="1"/>
             <a:r>
               <a:rPr lang="en-US" dirty="0"/>
-              <a:t>Text editor, drawing tool, PowerPoint</a:t>
-            </a:r>
-            <a:r>
-              <a:rPr lang="en-US" dirty="0"/>
-              <a:t>, compiler</a:t>
-            </a:r>
-            <a:endParaRPr lang="en-US" dirty="0"/>
+              <a:t>Text editor, drawing tool, PowerPoint, compiler</a:t>
+            </a:r>
           </a:p>
           <a:p>
             <a:pPr lvl="7"/>
@@ -13911,7 +13879,7 @@
     </p:spTree>
     <p:extLst>
       <p:ext uri="{BB962C8B-B14F-4D97-AF65-F5344CB8AC3E}">
-        <p14:creationId xmlns:p14="http://schemas.microsoft.com/office/powerpoint/2010/main" val="3869474441"/>
+        <p14:creationId xmlns:p14="http://schemas.microsoft.com/office/powerpoint/2010/main" xmlns="" val="3869474441"/>
       </p:ext>
     </p:extLst>
   </p:cSld>
@@ -13921,7 +13889,7 @@
   <p:timing>
     <p:tnLst>
       <p:par>
-        <p:cTn xmlns:p14="http://schemas.microsoft.com/office/powerpoint/2010/main" id="1" dur="indefinite" restart="never" nodeType="tmRoot"/>
+        <p:cTn id="1" dur="indefinite" restart="never" nodeType="tmRoot"/>
       </p:par>
     </p:tnLst>
   </p:timing>
@@ -14174,7 +14142,7 @@
         <a:effectLst/>
         <a:extLst>
           <a:ext uri="{AF507438-7753-43e0-B8FC-AC1667EBCBE1}">
-            <a14:hiddenEffects xmlns:a14="http://schemas.microsoft.com/office/drawing/2010/main">
+            <a14:hiddenEffects xmlns:a14="http://schemas.microsoft.com/office/drawing/2010/main" xmlns="">
               <a:effectLst>
                 <a:outerShdw blurRad="63500" dist="38099" dir="2700000" algn="ctr" rotWithShape="0">
                   <a:schemeClr val="bg2">
@@ -14250,7 +14218,7 @@
         <a:effectLst/>
         <a:extLst>
           <a:ext uri="{AF507438-7753-43e0-B8FC-AC1667EBCBE1}">
-            <a14:hiddenEffects xmlns:a14="http://schemas.microsoft.com/office/drawing/2010/main">
+            <a14:hiddenEffects xmlns:a14="http://schemas.microsoft.com/office/drawing/2010/main" xmlns="">
               <a:effectLst>
                 <a:outerShdw blurRad="63500" dist="38099" dir="2700000" algn="ctr" rotWithShape="0">
                   <a:schemeClr val="bg2">

</xml_diff>